<commit_message>
! cập nhật danh sách đăng ký đề tài khóa T188
</commit_message>
<xml_diff>
--- a/lessions/Android_Par05_IntentAndContentProvider.pptx
+++ b/lessions/Android_Par05_IntentAndContentProvider.pptx
@@ -374,6 +374,11 @@
         </p:txBody>
       </p:sp>
     </p:spTree>
+    <p:extLst>
+      <p:ext uri="{BB962C8B-B14F-4D97-AF65-F5344CB8AC3E}">
+        <p14:creationId xmlns:p14="http://schemas.microsoft.com/office/powerpoint/2010/main" val="3993763713"/>
+      </p:ext>
+    </p:extLst>
   </p:cSld>
   <p:clrMap bg1="lt1" tx1="dk1" bg2="lt2" tx2="dk2" accent1="accent1" accent2="accent2" accent3="accent3" accent4="accent4" accent5="accent5" accent6="accent6" hlink="hlink" folHlink="folHlink"/>
 </p:handoutMaster>
@@ -500,7 +505,7 @@
         <p:nvSpPr>
           <p:cNvPr id="13316" name="Rectangle 4"/>
           <p:cNvSpPr>
-            <a:spLocks noGrp="1" noRot="1" noChangeArrowheads="1" noTextEdit="1"/>
+            <a:spLocks noGrp="1" noRot="1" noChangeAspect="1" noChangeArrowheads="1" noTextEdit="1"/>
           </p:cNvSpPr>
           <p:nvPr>
             <p:ph type="sldImg" idx="2"/>
@@ -696,6 +701,11 @@
         </p:txBody>
       </p:sp>
     </p:spTree>
+    <p:extLst>
+      <p:ext uri="{BB962C8B-B14F-4D97-AF65-F5344CB8AC3E}">
+        <p14:creationId xmlns:p14="http://schemas.microsoft.com/office/powerpoint/2010/main" val="1912330636"/>
+      </p:ext>
+    </p:extLst>
   </p:cSld>
   <p:clrMap bg1="lt1" tx1="dk1" bg2="lt2" tx2="dk2" accent1="accent1" accent2="accent2" accent3="accent3" accent4="accent4" accent5="accent5" accent6="accent6" hlink="hlink" folHlink="folHlink"/>
   <p:notesStyle>
@@ -870,7 +880,7 @@
         <p:nvSpPr>
           <p:cNvPr id="16386" name="Rectangle 2"/>
           <p:cNvSpPr>
-            <a:spLocks noGrp="1" noRot="1" noChangeArrowheads="1" noTextEdit="1"/>
+            <a:spLocks noGrp="1" noRot="1" noChangeAspect="1" noChangeArrowheads="1" noTextEdit="1"/>
           </p:cNvSpPr>
           <p:nvPr>
             <p:ph type="sldImg"/>
@@ -2639,7 +2649,7 @@
               <a:pPr>
                 <a:defRPr/>
               </a:pPr>
-              <a:t>26/10/2011</a:t>
+              <a:t>07/05/2012</a:t>
             </a:fld>
             <a:endParaRPr lang="en-US"/>
           </a:p>
@@ -2807,7 +2817,7 @@
               <a:pPr>
                 <a:defRPr/>
               </a:pPr>
-              <a:t>26/10/2011</a:t>
+              <a:t>07/05/2012</a:t>
             </a:fld>
             <a:endParaRPr lang="en-US"/>
           </a:p>
@@ -3018,7 +3028,7 @@
               <a:pPr>
                 <a:defRPr/>
               </a:pPr>
-              <a:t>26/10/2011</a:t>
+              <a:t>07/05/2012</a:t>
             </a:fld>
             <a:endParaRPr lang="en-US"/>
           </a:p>
@@ -3219,7 +3229,7 @@
               <a:pPr>
                 <a:defRPr/>
               </a:pPr>
-              <a:t>26/10/2011</a:t>
+              <a:t>07/05/2012</a:t>
             </a:fld>
             <a:endParaRPr lang="en-US"/>
           </a:p>
@@ -3442,7 +3452,7 @@
               <a:pPr>
                 <a:defRPr/>
               </a:pPr>
-              <a:t>26/10/2011</a:t>
+              <a:t>07/05/2012</a:t>
             </a:fld>
             <a:endParaRPr lang="en-US"/>
           </a:p>
@@ -3761,7 +3771,7 @@
               <a:pPr>
                 <a:defRPr/>
               </a:pPr>
-              <a:t>26/10/2011</a:t>
+              <a:t>07/05/2012</a:t>
             </a:fld>
             <a:endParaRPr lang="en-US"/>
           </a:p>
@@ -4219,7 +4229,7 @@
               <a:pPr>
                 <a:defRPr/>
               </a:pPr>
-              <a:t>26/10/2011</a:t>
+              <a:t>07/05/2012</a:t>
             </a:fld>
             <a:endParaRPr lang="en-US"/>
           </a:p>
@@ -4368,7 +4378,7 @@
               <a:pPr>
                 <a:defRPr/>
               </a:pPr>
-              <a:t>26/10/2011</a:t>
+              <a:t>07/05/2012</a:t>
             </a:fld>
             <a:endParaRPr lang="en-US"/>
           </a:p>
@@ -4494,7 +4504,7 @@
               <a:pPr>
                 <a:defRPr/>
               </a:pPr>
-              <a:t>26/10/2011</a:t>
+              <a:t>07/05/2012</a:t>
             </a:fld>
             <a:endParaRPr lang="en-US"/>
           </a:p>
@@ -4802,7 +4812,7 @@
               <a:pPr>
                 <a:defRPr/>
               </a:pPr>
-              <a:t>26/10/2011</a:t>
+              <a:t>07/05/2012</a:t>
             </a:fld>
             <a:endParaRPr lang="en-US"/>
           </a:p>
@@ -5087,7 +5097,7 @@
               <a:pPr>
                 <a:defRPr/>
               </a:pPr>
-              <a:t>26/10/2011</a:t>
+              <a:t>07/05/2012</a:t>
             </a:fld>
             <a:endParaRPr lang="en-US"/>
           </a:p>
@@ -5653,7 +5663,7 @@
               <a:pPr>
                 <a:defRPr/>
               </a:pPr>
-              <a:t>26/10/2011</a:t>
+              <a:t>07/05/2012</a:t>
             </a:fld>
             <a:endParaRPr lang="en-US"/>
           </a:p>
@@ -6278,7 +6288,7 @@
             <a:fld id="{B30B7336-AA02-4DF6-A8B5-DB6601B04CC3}" type="datetime1">
               <a:rPr lang="vi-VN" smtClean="0"/>
               <a:pPr/>
-              <a:t>26/10/2011</a:t>
+              <a:t>07/05/2012</a:t>
             </a:fld>
             <a:endParaRPr lang="en-US" smtClean="0"/>
           </a:p>
@@ -6601,7 +6611,7 @@
                 </a:spcAft>
                 <a:defRPr/>
               </a:pPr>
-              <a:t>10/26/2011</a:t>
+              <a:t>5/7/2012</a:t>
             </a:fld>
             <a:endParaRPr lang="en-US" sz="1200">
               <a:solidFill>
@@ -6782,6 +6792,13 @@
   <p:clrMapOvr>
     <a:masterClrMapping/>
   </p:clrMapOvr>
+  <p:timing>
+    <p:tnLst>
+      <p:par>
+        <p:cTn id="1" dur="indefinite" restart="never" nodeType="tmRoot"/>
+      </p:par>
+    </p:tnLst>
+  </p:timing>
 </p:sld>
 </file>
 
@@ -6880,7 +6897,7 @@
                 </a:spcAft>
                 <a:defRPr/>
               </a:pPr>
-              <a:t>10/26/2011</a:t>
+              <a:t>5/7/2012</a:t>
             </a:fld>
             <a:endParaRPr lang="en-US" sz="1200">
               <a:solidFill>
@@ -7204,7 +7221,7 @@
                 </a:spcAft>
                 <a:defRPr/>
               </a:pPr>
-              <a:t>10/26/2011</a:t>
+              <a:t>5/7/2012</a:t>
             </a:fld>
             <a:endParaRPr lang="en-US" sz="1200">
               <a:solidFill>
@@ -7493,7 +7510,7 @@
                 </a:spcAft>
                 <a:defRPr/>
               </a:pPr>
-              <a:t>10/26/2011</a:t>
+              <a:t>5/7/2012</a:t>
             </a:fld>
             <a:endParaRPr lang="en-US" sz="1200">
               <a:solidFill>
@@ -7815,7 +7832,7 @@
                 </a:spcAft>
                 <a:defRPr/>
               </a:pPr>
-              <a:t>10/26/2011</a:t>
+              <a:t>5/7/2012</a:t>
             </a:fld>
             <a:endParaRPr lang="en-US" sz="1200">
               <a:solidFill>
@@ -8042,7 +8059,7 @@
             <a:fld id="{B85BD852-BB3C-409D-94BB-C2F59B6F63AC}" type="datetime1">
               <a:rPr lang="vi-VN" smtClean="0"/>
               <a:pPr/>
-              <a:t>26/10/2011</a:t>
+              <a:t>07/05/2012</a:t>
             </a:fld>
             <a:endParaRPr lang="en-US" smtClean="0"/>
           </a:p>
@@ -8306,6 +8323,13 @@
   <p:clrMapOvr>
     <a:masterClrMapping/>
   </p:clrMapOvr>
+  <p:timing>
+    <p:tnLst>
+      <p:par>
+        <p:cTn id="1" dur="indefinite" restart="never" nodeType="tmRoot"/>
+      </p:par>
+    </p:tnLst>
+  </p:timing>
 </p:sld>
 </file>
 
@@ -8484,6 +8508,13 @@
   <p:clrMapOvr>
     <a:masterClrMapping/>
   </p:clrMapOvr>
+  <p:timing>
+    <p:tnLst>
+      <p:par>
+        <p:cTn id="1" dur="indefinite" restart="never" nodeType="tmRoot"/>
+      </p:par>
+    </p:tnLst>
+  </p:timing>
 </p:sld>
 </file>
 
@@ -8648,6 +8679,13 @@
   <p:clrMapOvr>
     <a:masterClrMapping/>
   </p:clrMapOvr>
+  <p:timing>
+    <p:tnLst>
+      <p:par>
+        <p:cTn id="1" dur="indefinite" restart="never" nodeType="tmRoot"/>
+      </p:par>
+    </p:tnLst>
+  </p:timing>
 </p:sld>
 </file>
 
@@ -8787,6 +8825,13 @@
   <p:clrMapOvr>
     <a:masterClrMapping/>
   </p:clrMapOvr>
+  <p:timing>
+    <p:tnLst>
+      <p:par>
+        <p:cTn id="1" dur="indefinite" restart="never" nodeType="tmRoot"/>
+      </p:par>
+    </p:tnLst>
+  </p:timing>
 </p:sld>
 </file>
 
@@ -8998,6 +9043,13 @@
   <p:clrMapOvr>
     <a:masterClrMapping/>
   </p:clrMapOvr>
+  <p:timing>
+    <p:tnLst>
+      <p:par>
+        <p:cTn id="1" dur="indefinite" restart="never" nodeType="tmRoot"/>
+      </p:par>
+    </p:tnLst>
+  </p:timing>
 </p:sld>
 </file>
 
@@ -9132,6 +9184,13 @@
   <p:clrMapOvr>
     <a:masterClrMapping/>
   </p:clrMapOvr>
+  <p:timing>
+    <p:tnLst>
+      <p:par>
+        <p:cTn id="1" dur="indefinite" restart="never" nodeType="tmRoot"/>
+      </p:par>
+    </p:tnLst>
+  </p:timing>
 </p:sld>
 </file>
 
@@ -9265,6 +9324,13 @@
   <p:clrMapOvr>
     <a:masterClrMapping/>
   </p:clrMapOvr>
+  <p:timing>
+    <p:tnLst>
+      <p:par>
+        <p:cTn id="1" dur="indefinite" restart="never" nodeType="tmRoot"/>
+      </p:par>
+    </p:tnLst>
+  </p:timing>
 </p:sld>
 </file>
 
@@ -9400,6 +9466,13 @@
   <p:clrMapOvr>
     <a:masterClrMapping/>
   </p:clrMapOvr>
+  <p:timing>
+    <p:tnLst>
+      <p:par>
+        <p:cTn id="1" dur="indefinite" restart="never" nodeType="tmRoot"/>
+      </p:par>
+    </p:tnLst>
+  </p:timing>
 </p:sld>
 </file>
 

</xml_diff>